<commit_message>
Updated sketch to include dropdown for directors
</commit_message>
<xml_diff>
--- a/img/sketch/app_sketch.pptx
+++ b/img/sketch/app_sketch.pptx
@@ -197,7 +197,7 @@
           <a:p>
             <a:fld id="{32DD0055-43E6-9044-95AF-B65387BEF08C}" type="datetimeFigureOut">
               <a:rPr lang="en-US" smtClean="0"/>
-              <a:t>11/29/2019</a:t>
+              <a:t>12/6/2019</a:t>
             </a:fld>
             <a:endParaRPr lang="en-US"/>
           </a:p>
@@ -593,7 +593,7 @@
           <a:p>
             <a:fld id="{24F81815-F26E-0943-B0A9-F4657508C3D9}" type="datetimeFigureOut">
               <a:rPr lang="en-US" smtClean="0"/>
-              <a:t>11/29/2019</a:t>
+              <a:t>12/6/2019</a:t>
             </a:fld>
             <a:endParaRPr lang="en-US"/>
           </a:p>
@@ -761,7 +761,7 @@
           <a:p>
             <a:fld id="{24F81815-F26E-0943-B0A9-F4657508C3D9}" type="datetimeFigureOut">
               <a:rPr lang="en-US" smtClean="0"/>
-              <a:t>11/29/2019</a:t>
+              <a:t>12/6/2019</a:t>
             </a:fld>
             <a:endParaRPr lang="en-US"/>
           </a:p>
@@ -939,7 +939,7 @@
           <a:p>
             <a:fld id="{24F81815-F26E-0943-B0A9-F4657508C3D9}" type="datetimeFigureOut">
               <a:rPr lang="en-US" smtClean="0"/>
-              <a:t>11/29/2019</a:t>
+              <a:t>12/6/2019</a:t>
             </a:fld>
             <a:endParaRPr lang="en-US"/>
           </a:p>
@@ -1107,7 +1107,7 @@
           <a:p>
             <a:fld id="{24F81815-F26E-0943-B0A9-F4657508C3D9}" type="datetimeFigureOut">
               <a:rPr lang="en-US" smtClean="0"/>
-              <a:t>11/29/2019</a:t>
+              <a:t>12/6/2019</a:t>
             </a:fld>
             <a:endParaRPr lang="en-US"/>
           </a:p>
@@ -1352,7 +1352,7 @@
           <a:p>
             <a:fld id="{24F81815-F26E-0943-B0A9-F4657508C3D9}" type="datetimeFigureOut">
               <a:rPr lang="en-US" smtClean="0"/>
-              <a:t>11/29/2019</a:t>
+              <a:t>12/6/2019</a:t>
             </a:fld>
             <a:endParaRPr lang="en-US"/>
           </a:p>
@@ -1581,7 +1581,7 @@
           <a:p>
             <a:fld id="{24F81815-F26E-0943-B0A9-F4657508C3D9}" type="datetimeFigureOut">
               <a:rPr lang="en-US" smtClean="0"/>
-              <a:t>11/29/2019</a:t>
+              <a:t>12/6/2019</a:t>
             </a:fld>
             <a:endParaRPr lang="en-US"/>
           </a:p>
@@ -1945,7 +1945,7 @@
           <a:p>
             <a:fld id="{24F81815-F26E-0943-B0A9-F4657508C3D9}" type="datetimeFigureOut">
               <a:rPr lang="en-US" smtClean="0"/>
-              <a:t>11/29/2019</a:t>
+              <a:t>12/6/2019</a:t>
             </a:fld>
             <a:endParaRPr lang="en-US"/>
           </a:p>
@@ -2062,7 +2062,7 @@
           <a:p>
             <a:fld id="{24F81815-F26E-0943-B0A9-F4657508C3D9}" type="datetimeFigureOut">
               <a:rPr lang="en-US" smtClean="0"/>
-              <a:t>11/29/2019</a:t>
+              <a:t>12/6/2019</a:t>
             </a:fld>
             <a:endParaRPr lang="en-US"/>
           </a:p>
@@ -2157,7 +2157,7 @@
           <a:p>
             <a:fld id="{24F81815-F26E-0943-B0A9-F4657508C3D9}" type="datetimeFigureOut">
               <a:rPr lang="en-US" smtClean="0"/>
-              <a:t>11/29/2019</a:t>
+              <a:t>12/6/2019</a:t>
             </a:fld>
             <a:endParaRPr lang="en-US"/>
           </a:p>
@@ -2432,7 +2432,7 @@
           <a:p>
             <a:fld id="{24F81815-F26E-0943-B0A9-F4657508C3D9}" type="datetimeFigureOut">
               <a:rPr lang="en-US" smtClean="0"/>
-              <a:t>11/29/2019</a:t>
+              <a:t>12/6/2019</a:t>
             </a:fld>
             <a:endParaRPr lang="en-US"/>
           </a:p>
@@ -2684,7 +2684,7 @@
           <a:p>
             <a:fld id="{24F81815-F26E-0943-B0A9-F4657508C3D9}" type="datetimeFigureOut">
               <a:rPr lang="en-US" smtClean="0"/>
-              <a:t>11/29/2019</a:t>
+              <a:t>12/6/2019</a:t>
             </a:fld>
             <a:endParaRPr lang="en-US"/>
           </a:p>
@@ -2895,7 +2895,7 @@
           <a:p>
             <a:fld id="{24F81815-F26E-0943-B0A9-F4657508C3D9}" type="datetimeFigureOut">
               <a:rPr lang="en-US" smtClean="0"/>
-              <a:t>11/29/2019</a:t>
+              <a:t>12/6/2019</a:t>
             </a:fld>
             <a:endParaRPr lang="en-US"/>
           </a:p>
@@ -3436,8 +3436,8 @@
           </p:nvSpPr>
           <p:spPr>
             <a:xfrm>
-              <a:off x="4766913" y="1280484"/>
-              <a:ext cx="293914" cy="1175657"/>
+              <a:off x="4766912" y="741220"/>
+              <a:ext cx="359090" cy="1714921"/>
             </a:xfrm>
             <a:prstGeom prst="rect">
               <a:avLst/>
@@ -3477,8 +3477,8 @@
           </p:nvSpPr>
           <p:spPr>
             <a:xfrm>
-              <a:off x="5287728" y="1760870"/>
-              <a:ext cx="283029" cy="693964"/>
+              <a:off x="5287726" y="873608"/>
+              <a:ext cx="321819" cy="1581226"/>
             </a:xfrm>
             <a:prstGeom prst="rect">
               <a:avLst/>
@@ -3600,8 +3600,8 @@
           </p:nvSpPr>
           <p:spPr>
             <a:xfrm>
-              <a:off x="6961412" y="1159329"/>
-              <a:ext cx="277586" cy="1314449"/>
+              <a:off x="6918034" y="1605408"/>
+              <a:ext cx="341385" cy="862165"/>
             </a:xfrm>
             <a:prstGeom prst="rect">
               <a:avLst/>
@@ -3629,7 +3629,7 @@
             <a:lstStyle/>
             <a:p>
               <a:pPr algn="ctr"/>
-              <a:endParaRPr lang="en-US"/>
+              <a:endParaRPr lang="en-US" dirty="0"/>
             </a:p>
           </p:txBody>
         </p:sp>
@@ -3641,8 +3641,8 @@
           </p:nvSpPr>
           <p:spPr>
             <a:xfrm>
-              <a:off x="7507063" y="2144409"/>
-              <a:ext cx="291196" cy="324633"/>
+              <a:off x="7507064" y="1666019"/>
+              <a:ext cx="397132" cy="803023"/>
             </a:xfrm>
             <a:prstGeom prst="rect">
               <a:avLst/>
@@ -3723,8 +3723,8 @@
           </p:nvSpPr>
           <p:spPr>
             <a:xfrm>
-              <a:off x="8661292" y="810203"/>
-              <a:ext cx="310242" cy="1663575"/>
+              <a:off x="8661292" y="1868156"/>
+              <a:ext cx="334653" cy="605621"/>
             </a:xfrm>
             <a:prstGeom prst="rect">
               <a:avLst/>
@@ -3764,8 +3764,8 @@
           </p:nvSpPr>
           <p:spPr>
             <a:xfrm>
-              <a:off x="9268170" y="1528660"/>
-              <a:ext cx="321124" cy="953283"/>
+              <a:off x="9268170" y="2013702"/>
+              <a:ext cx="351933" cy="468241"/>
             </a:xfrm>
             <a:prstGeom prst="rect">
               <a:avLst/>
@@ -3805,8 +3805,8 @@
           </p:nvSpPr>
           <p:spPr>
             <a:xfrm>
-              <a:off x="9904987" y="1257300"/>
-              <a:ext cx="332014" cy="1216478"/>
+              <a:off x="9904987" y="2200724"/>
+              <a:ext cx="274156" cy="273054"/>
             </a:xfrm>
             <a:prstGeom prst="rect">
               <a:avLst/>
@@ -4935,7 +4935,7 @@
           </p:nvSpPr>
           <p:spPr>
             <a:xfrm>
-              <a:off x="5216954" y="3483539"/>
+              <a:off x="5206226" y="3643454"/>
               <a:ext cx="1072243" cy="369331"/>
             </a:xfrm>
             <a:prstGeom prst="rect">
@@ -5512,8 +5512,8 @@
         </p:nvSpPr>
         <p:spPr>
           <a:xfrm>
-            <a:off x="2692746" y="548755"/>
-            <a:ext cx="5940513" cy="553998"/>
+            <a:off x="1303000" y="548755"/>
+            <a:ext cx="7330259" cy="553998"/>
           </a:xfrm>
           <a:prstGeom prst="rect">
             <a:avLst/>
@@ -5526,7 +5526,6 @@
           </a:bodyPr>
           <a:lstStyle/>
           <a:p>
-            <a:pPr algn="ctr"/>
             <a:r>
               <a:rPr lang="en-US" dirty="0">
                 <a:latin typeface="Berlin Sans FB" panose="020E0602020502020306" pitchFamily="34" charset="0"/>
@@ -5537,7 +5536,6 @@
             </a:r>
           </a:p>
           <a:p>
-            <a:pPr algn="ctr"/>
             <a:r>
               <a:rPr lang="en-US" sz="1200" dirty="0">
                 <a:latin typeface="Berlin Sans FB" panose="020E0602020502020306" pitchFamily="34" charset="0"/>
@@ -5973,7 +5971,7 @@
         </p:nvSpPr>
         <p:spPr>
           <a:xfrm>
-            <a:off x="3188657" y="1346430"/>
+            <a:off x="6291028" y="1310376"/>
             <a:ext cx="3122744" cy="246864"/>
           </a:xfrm>
           <a:prstGeom prst="rect">
@@ -6011,7 +6009,7 @@
         </p:nvSpPr>
         <p:spPr>
           <a:xfrm>
-            <a:off x="3106065" y="1303190"/>
+            <a:off x="6208436" y="1267136"/>
             <a:ext cx="3081449" cy="307777"/>
           </a:xfrm>
           <a:prstGeom prst="rect">
@@ -6480,6 +6478,226 @@
           </a:fontRef>
         </p:style>
       </p:cxnSp>
+      <p:sp>
+        <p:nvSpPr>
+          <p:cNvPr id="81" name="TextBox 80">
+            <a:extLst>
+              <a:ext uri="{FF2B5EF4-FFF2-40B4-BE49-F238E27FC236}">
+                <a16:creationId xmlns:a16="http://schemas.microsoft.com/office/drawing/2014/main" id="{EB8D4A63-443B-40A5-A18B-2D69FD707693}"/>
+              </a:ext>
+            </a:extLst>
+          </p:cNvPr>
+          <p:cNvSpPr txBox="1"/>
+          <p:nvPr/>
+        </p:nvSpPr>
+        <p:spPr>
+          <a:xfrm>
+            <a:off x="3589530" y="1226713"/>
+            <a:ext cx="1590440" cy="369332"/>
+          </a:xfrm>
+          <a:prstGeom prst="rect">
+            <a:avLst/>
+          </a:prstGeom>
+          <a:noFill/>
+        </p:spPr>
+        <p:txBody>
+          <a:bodyPr wrap="square" rtlCol="0">
+            <a:spAutoFit/>
+          </a:bodyPr>
+          <a:lstStyle/>
+          <a:p>
+            <a:r>
+              <a:rPr lang="en-US" dirty="0">
+                <a:latin typeface="Berlin Sans FB" panose="020E0602020502020306" pitchFamily="34" charset="0"/>
+                <a:ea typeface="Chalkboard" charset="0"/>
+                <a:cs typeface="Chalkboard" charset="0"/>
+              </a:rPr>
+              <a:t>Directors</a:t>
+            </a:r>
+          </a:p>
+        </p:txBody>
+      </p:sp>
+      <p:sp>
+        <p:nvSpPr>
+          <p:cNvPr id="82" name="TextBox 81">
+            <a:extLst>
+              <a:ext uri="{FF2B5EF4-FFF2-40B4-BE49-F238E27FC236}">
+                <a16:creationId xmlns:a16="http://schemas.microsoft.com/office/drawing/2014/main" id="{66CFCC52-A62B-45F3-9396-E9715CA88799}"/>
+              </a:ext>
+            </a:extLst>
+          </p:cNvPr>
+          <p:cNvSpPr txBox="1"/>
+          <p:nvPr/>
+        </p:nvSpPr>
+        <p:spPr>
+          <a:xfrm>
+            <a:off x="5332860" y="606673"/>
+            <a:ext cx="1291810" cy="584775"/>
+          </a:xfrm>
+          <a:prstGeom prst="rect">
+            <a:avLst/>
+          </a:prstGeom>
+          <a:noFill/>
+        </p:spPr>
+        <p:txBody>
+          <a:bodyPr wrap="square" rtlCol="0">
+            <a:spAutoFit/>
+          </a:bodyPr>
+          <a:lstStyle/>
+          <a:p>
+            <a:r>
+              <a:rPr lang="en-US" sz="1600" b="1" dirty="0">
+                <a:latin typeface="Ink Free" panose="03080402000500000000" pitchFamily="66" charset="0"/>
+                <a:ea typeface="Bradley Hand" charset="0"/>
+                <a:cs typeface="Bradley Hand" charset="0"/>
+              </a:rPr>
+              <a:t>Dropdown </a:t>
+            </a:r>
+          </a:p>
+          <a:p>
+            <a:r>
+              <a:rPr lang="en-US" sz="1600" b="1" dirty="0">
+                <a:latin typeface="Ink Free" panose="03080402000500000000" pitchFamily="66" charset="0"/>
+                <a:ea typeface="Bradley Hand" charset="0"/>
+                <a:cs typeface="Bradley Hand" charset="0"/>
+              </a:rPr>
+              <a:t>Menu </a:t>
+            </a:r>
+          </a:p>
+        </p:txBody>
+      </p:sp>
+      <p:sp>
+        <p:nvSpPr>
+          <p:cNvPr id="84" name="Rectangle 83">
+            <a:extLst>
+              <a:ext uri="{FF2B5EF4-FFF2-40B4-BE49-F238E27FC236}">
+                <a16:creationId xmlns:a16="http://schemas.microsoft.com/office/drawing/2014/main" id="{BD328FEE-C2FF-4CA6-87E4-062375EAEEA0}"/>
+              </a:ext>
+            </a:extLst>
+          </p:cNvPr>
+          <p:cNvSpPr/>
+          <p:nvPr/>
+        </p:nvSpPr>
+        <p:spPr>
+          <a:xfrm>
+            <a:off x="4637862" y="1302158"/>
+            <a:ext cx="813046" cy="246864"/>
+          </a:xfrm>
+          <a:prstGeom prst="rect">
+            <a:avLst/>
+          </a:prstGeom>
+        </p:spPr>
+        <p:style>
+          <a:lnRef idx="2">
+            <a:schemeClr val="accent6"/>
+          </a:lnRef>
+          <a:fillRef idx="1">
+            <a:schemeClr val="lt1"/>
+          </a:fillRef>
+          <a:effectRef idx="0">
+            <a:schemeClr val="accent6"/>
+          </a:effectRef>
+          <a:fontRef idx="minor">
+            <a:schemeClr val="dk1"/>
+          </a:fontRef>
+        </p:style>
+        <p:txBody>
+          <a:bodyPr rtlCol="0" anchor="ctr"/>
+          <a:lstStyle/>
+          <a:p>
+            <a:pPr algn="ctr"/>
+            <a:endParaRPr lang="en-US"/>
+          </a:p>
+        </p:txBody>
+      </p:sp>
+      <p:cxnSp>
+        <p:nvCxnSpPr>
+          <p:cNvPr id="3" name="Straight Arrow Connector 2">
+            <a:extLst>
+              <a:ext uri="{FF2B5EF4-FFF2-40B4-BE49-F238E27FC236}">
+                <a16:creationId xmlns:a16="http://schemas.microsoft.com/office/drawing/2014/main" id="{607AEF11-1271-46AE-AE19-E462D4FF5367}"/>
+              </a:ext>
+            </a:extLst>
+          </p:cNvPr>
+          <p:cNvCxnSpPr/>
+          <p:nvPr/>
+        </p:nvCxnSpPr>
+        <p:spPr>
+          <a:xfrm flipH="1">
+            <a:off x="5208973" y="1128693"/>
+            <a:ext cx="210836" cy="126791"/>
+          </a:xfrm>
+          <a:prstGeom prst="straightConnector1">
+            <a:avLst/>
+          </a:prstGeom>
+          <a:ln>
+            <a:solidFill>
+              <a:schemeClr val="tx1"/>
+            </a:solidFill>
+            <a:tailEnd type="triangle"/>
+          </a:ln>
+        </p:spPr>
+        <p:style>
+          <a:lnRef idx="1">
+            <a:schemeClr val="accent1"/>
+          </a:lnRef>
+          <a:fillRef idx="0">
+            <a:schemeClr val="accent1"/>
+          </a:fillRef>
+          <a:effectRef idx="0">
+            <a:schemeClr val="accent1"/>
+          </a:effectRef>
+          <a:fontRef idx="minor">
+            <a:schemeClr val="tx1"/>
+          </a:fontRef>
+        </p:style>
+      </p:cxnSp>
+      <p:sp>
+        <p:nvSpPr>
+          <p:cNvPr id="87" name="Triangle 46">
+            <a:extLst>
+              <a:ext uri="{FF2B5EF4-FFF2-40B4-BE49-F238E27FC236}">
+                <a16:creationId xmlns:a16="http://schemas.microsoft.com/office/drawing/2014/main" id="{79E296AB-C66C-46E8-982A-64BD93088FA6}"/>
+              </a:ext>
+            </a:extLst>
+          </p:cNvPr>
+          <p:cNvSpPr/>
+          <p:nvPr/>
+        </p:nvSpPr>
+        <p:spPr>
+          <a:xfrm flipH="1" flipV="1">
+            <a:off x="5210357" y="1352382"/>
+            <a:ext cx="194638" cy="137283"/>
+          </a:xfrm>
+          <a:prstGeom prst="triangle">
+            <a:avLst/>
+          </a:prstGeom>
+        </p:spPr>
+        <p:style>
+          <a:lnRef idx="2">
+            <a:schemeClr val="dk1">
+              <a:shade val="50000"/>
+            </a:schemeClr>
+          </a:lnRef>
+          <a:fillRef idx="1">
+            <a:schemeClr val="dk1"/>
+          </a:fillRef>
+          <a:effectRef idx="0">
+            <a:schemeClr val="dk1"/>
+          </a:effectRef>
+          <a:fontRef idx="minor">
+            <a:schemeClr val="lt1"/>
+          </a:fontRef>
+        </p:style>
+        <p:txBody>
+          <a:bodyPr rtlCol="0" anchor="ctr"/>
+          <a:lstStyle/>
+          <a:p>
+            <a:pPr algn="ctr"/>
+            <a:endParaRPr lang="en-US"/>
+          </a:p>
+        </p:txBody>
+      </p:sp>
     </p:spTree>
     <p:extLst>
       <p:ext uri="{BB962C8B-B14F-4D97-AF65-F5344CB8AC3E}">

</xml_diff>